<commit_message>
Updating presentation: ravioli code
</commit_message>
<xml_diff>
--- a/Presentation/Writing Testable Software.pptx
+++ b/Presentation/Writing Testable Software.pptx
@@ -258,7 +258,7 @@
           <a:p>
             <a:fld id="{548CFAF3-1BC5-4667-96A9-C1D2F8CAB108}" type="datetimeFigureOut">
               <a:rPr lang="en-GB" smtClean="0"/>
-              <a:t>06/12/2016</a:t>
+              <a:t>10/12/2016</a:t>
             </a:fld>
             <a:endParaRPr lang="en-GB"/>
           </a:p>
@@ -428,7 +428,7 @@
           <a:p>
             <a:fld id="{548CFAF3-1BC5-4667-96A9-C1D2F8CAB108}" type="datetimeFigureOut">
               <a:rPr lang="en-GB" smtClean="0"/>
-              <a:t>06/12/2016</a:t>
+              <a:t>10/12/2016</a:t>
             </a:fld>
             <a:endParaRPr lang="en-GB"/>
           </a:p>
@@ -608,7 +608,7 @@
           <a:p>
             <a:fld id="{548CFAF3-1BC5-4667-96A9-C1D2F8CAB108}" type="datetimeFigureOut">
               <a:rPr lang="en-GB" smtClean="0"/>
-              <a:t>06/12/2016</a:t>
+              <a:t>10/12/2016</a:t>
             </a:fld>
             <a:endParaRPr lang="en-GB"/>
           </a:p>
@@ -778,7 +778,7 @@
           <a:p>
             <a:fld id="{548CFAF3-1BC5-4667-96A9-C1D2F8CAB108}" type="datetimeFigureOut">
               <a:rPr lang="en-GB" smtClean="0"/>
-              <a:t>06/12/2016</a:t>
+              <a:t>10/12/2016</a:t>
             </a:fld>
             <a:endParaRPr lang="en-GB"/>
           </a:p>
@@ -1024,7 +1024,7 @@
           <a:p>
             <a:fld id="{548CFAF3-1BC5-4667-96A9-C1D2F8CAB108}" type="datetimeFigureOut">
               <a:rPr lang="en-GB" smtClean="0"/>
-              <a:t>06/12/2016</a:t>
+              <a:t>10/12/2016</a:t>
             </a:fld>
             <a:endParaRPr lang="en-GB"/>
           </a:p>
@@ -1256,7 +1256,7 @@
           <a:p>
             <a:fld id="{548CFAF3-1BC5-4667-96A9-C1D2F8CAB108}" type="datetimeFigureOut">
               <a:rPr lang="en-GB" smtClean="0"/>
-              <a:t>06/12/2016</a:t>
+              <a:t>10/12/2016</a:t>
             </a:fld>
             <a:endParaRPr lang="en-GB"/>
           </a:p>
@@ -1623,7 +1623,7 @@
           <a:p>
             <a:fld id="{548CFAF3-1BC5-4667-96A9-C1D2F8CAB108}" type="datetimeFigureOut">
               <a:rPr lang="en-GB" smtClean="0"/>
-              <a:t>06/12/2016</a:t>
+              <a:t>10/12/2016</a:t>
             </a:fld>
             <a:endParaRPr lang="en-GB"/>
           </a:p>
@@ -1741,7 +1741,7 @@
           <a:p>
             <a:fld id="{548CFAF3-1BC5-4667-96A9-C1D2F8CAB108}" type="datetimeFigureOut">
               <a:rPr lang="en-GB" smtClean="0"/>
-              <a:t>06/12/2016</a:t>
+              <a:t>10/12/2016</a:t>
             </a:fld>
             <a:endParaRPr lang="en-GB"/>
           </a:p>
@@ -1836,7 +1836,7 @@
           <a:p>
             <a:fld id="{548CFAF3-1BC5-4667-96A9-C1D2F8CAB108}" type="datetimeFigureOut">
               <a:rPr lang="en-GB" smtClean="0"/>
-              <a:t>06/12/2016</a:t>
+              <a:t>10/12/2016</a:t>
             </a:fld>
             <a:endParaRPr lang="en-GB"/>
           </a:p>
@@ -2113,7 +2113,7 @@
           <a:p>
             <a:fld id="{548CFAF3-1BC5-4667-96A9-C1D2F8CAB108}" type="datetimeFigureOut">
               <a:rPr lang="en-GB" smtClean="0"/>
-              <a:t>06/12/2016</a:t>
+              <a:t>10/12/2016</a:t>
             </a:fld>
             <a:endParaRPr lang="en-GB"/>
           </a:p>
@@ -2366,7 +2366,7 @@
           <a:p>
             <a:fld id="{548CFAF3-1BC5-4667-96A9-C1D2F8CAB108}" type="datetimeFigureOut">
               <a:rPr lang="en-GB" smtClean="0"/>
-              <a:t>06/12/2016</a:t>
+              <a:t>10/12/2016</a:t>
             </a:fld>
             <a:endParaRPr lang="en-GB"/>
           </a:p>
@@ -2579,7 +2579,7 @@
           <a:p>
             <a:fld id="{548CFAF3-1BC5-4667-96A9-C1D2F8CAB108}" type="datetimeFigureOut">
               <a:rPr lang="en-GB" smtClean="0"/>
-              <a:t>06/12/2016</a:t>
+              <a:t>10/12/2016</a:t>
             </a:fld>
             <a:endParaRPr lang="en-GB"/>
           </a:p>
@@ -3931,7 +3931,6 @@
               <a:rPr lang="en-GB" dirty="0"/>
               <a:t>https://github.com/Ant-f/WritingTestableSoftware</a:t>
             </a:r>
-            <a:endParaRPr lang="en-GB" dirty="0"/>
           </a:p>
         </p:txBody>
       </p:sp>
@@ -4583,7 +4582,7 @@
           <a:p>
             <a:r>
               <a:rPr lang="en-GB" dirty="0"/>
-              <a:t>Only aim to produce “ravioli” code where appropriate; not by default</a:t>
+              <a:t>Only produce “ravioli” code where necessary</a:t>
             </a:r>
           </a:p>
           <a:p>
@@ -4657,7 +4656,7 @@
       </p:grpSpPr>
       <p:pic>
         <p:nvPicPr>
-          <p:cNvPr id="7" name="Picture 6"/>
+          <p:cNvPr id="2" name="Picture 1"/>
           <p:cNvPicPr>
             <a:picLocks noChangeAspect="1"/>
           </p:cNvPicPr>
@@ -4677,8 +4676,8 @@
         </p:blipFill>
         <p:spPr>
           <a:xfrm>
-            <a:off x="72000" y="-5"/>
-            <a:ext cx="11998602" cy="6889823"/>
+            <a:off x="-1" y="-3047"/>
+            <a:ext cx="12192002" cy="6864094"/>
           </a:xfrm>
           <a:prstGeom prst="rect">
             <a:avLst/>

</xml_diff>